<commit_message>
hive uygulama veri eklendi
</commit_message>
<xml_diff>
--- a/04-Buyuk-Veri-Sorgulama/01_hive/01_apache_hive_teori.pptx
+++ b/04-Buyuk-Veri-Sorgulama/01_hive/01_apache_hive_teori.pptx
@@ -5,7 +5,7 @@
     <p:sldMasterId id="2147483648" r:id="rId1"/>
   </p:sldMasterIdLst>
   <p:notesMasterIdLst>
-    <p:notesMasterId r:id="rId11"/>
+    <p:notesMasterId r:id="rId13"/>
   </p:notesMasterIdLst>
   <p:sldIdLst>
     <p:sldId id="257" r:id="rId2"/>
@@ -17,6 +17,8 @@
     <p:sldId id="261" r:id="rId8"/>
     <p:sldId id="262" r:id="rId9"/>
     <p:sldId id="263" r:id="rId10"/>
+    <p:sldId id="266" r:id="rId11"/>
+    <p:sldId id="267" r:id="rId12"/>
   </p:sldIdLst>
   <p:sldSz cx="12192000" cy="6858000"/>
   <p:notesSz cx="6858000" cy="9144000"/>
@@ -504,7 +506,7 @@
           <a:p>
             <a:fld id="{6F77F576-AE14-466D-AA6B-335273622B21}" type="datetimeFigureOut">
               <a:rPr lang="en-US" smtClean="0"/>
-              <a:t>10/9/2019</a:t>
+              <a:t>10/23/2019</a:t>
             </a:fld>
             <a:endParaRPr lang="en-US"/>
           </a:p>
@@ -903,7 +905,7 @@
           <a:p>
             <a:fld id="{54AA066D-271F-4C1A-B89A-0705A7689EE9}" type="datetimeFigureOut">
               <a:rPr lang="en-US" smtClean="0"/>
-              <a:t>10/9/2019</a:t>
+              <a:t>10/23/2019</a:t>
             </a:fld>
             <a:endParaRPr lang="en-US"/>
           </a:p>
@@ -1073,7 +1075,7 @@
           <a:p>
             <a:fld id="{54AA066D-271F-4C1A-B89A-0705A7689EE9}" type="datetimeFigureOut">
               <a:rPr lang="en-US" smtClean="0"/>
-              <a:t>10/9/2019</a:t>
+              <a:t>10/23/2019</a:t>
             </a:fld>
             <a:endParaRPr lang="en-US"/>
           </a:p>
@@ -1253,7 +1255,7 @@
           <a:p>
             <a:fld id="{54AA066D-271F-4C1A-B89A-0705A7689EE9}" type="datetimeFigureOut">
               <a:rPr lang="en-US" smtClean="0"/>
-              <a:t>10/9/2019</a:t>
+              <a:t>10/23/2019</a:t>
             </a:fld>
             <a:endParaRPr lang="en-US"/>
           </a:p>
@@ -1423,7 +1425,7 @@
           <a:p>
             <a:fld id="{54AA066D-271F-4C1A-B89A-0705A7689EE9}" type="datetimeFigureOut">
               <a:rPr lang="en-US" smtClean="0"/>
-              <a:t>10/9/2019</a:t>
+              <a:t>10/23/2019</a:t>
             </a:fld>
             <a:endParaRPr lang="en-US"/>
           </a:p>
@@ -1669,7 +1671,7 @@
           <a:p>
             <a:fld id="{54AA066D-271F-4C1A-B89A-0705A7689EE9}" type="datetimeFigureOut">
               <a:rPr lang="en-US" smtClean="0"/>
-              <a:t>10/9/2019</a:t>
+              <a:t>10/23/2019</a:t>
             </a:fld>
             <a:endParaRPr lang="en-US"/>
           </a:p>
@@ -1901,7 +1903,7 @@
           <a:p>
             <a:fld id="{54AA066D-271F-4C1A-B89A-0705A7689EE9}" type="datetimeFigureOut">
               <a:rPr lang="en-US" smtClean="0"/>
-              <a:t>10/9/2019</a:t>
+              <a:t>10/23/2019</a:t>
             </a:fld>
             <a:endParaRPr lang="en-US"/>
           </a:p>
@@ -2268,7 +2270,7 @@
           <a:p>
             <a:fld id="{54AA066D-271F-4C1A-B89A-0705A7689EE9}" type="datetimeFigureOut">
               <a:rPr lang="en-US" smtClean="0"/>
-              <a:t>10/9/2019</a:t>
+              <a:t>10/23/2019</a:t>
             </a:fld>
             <a:endParaRPr lang="en-US"/>
           </a:p>
@@ -2386,7 +2388,7 @@
           <a:p>
             <a:fld id="{54AA066D-271F-4C1A-B89A-0705A7689EE9}" type="datetimeFigureOut">
               <a:rPr lang="en-US" smtClean="0"/>
-              <a:t>10/9/2019</a:t>
+              <a:t>10/23/2019</a:t>
             </a:fld>
             <a:endParaRPr lang="en-US"/>
           </a:p>
@@ -2481,7 +2483,7 @@
           <a:p>
             <a:fld id="{54AA066D-271F-4C1A-B89A-0705A7689EE9}" type="datetimeFigureOut">
               <a:rPr lang="en-US" smtClean="0"/>
-              <a:t>10/9/2019</a:t>
+              <a:t>10/23/2019</a:t>
             </a:fld>
             <a:endParaRPr lang="en-US"/>
           </a:p>
@@ -2758,7 +2760,7 @@
           <a:p>
             <a:fld id="{54AA066D-271F-4C1A-B89A-0705A7689EE9}" type="datetimeFigureOut">
               <a:rPr lang="en-US" smtClean="0"/>
-              <a:t>10/9/2019</a:t>
+              <a:t>10/23/2019</a:t>
             </a:fld>
             <a:endParaRPr lang="en-US"/>
           </a:p>
@@ -3011,7 +3013,7 @@
           <a:p>
             <a:fld id="{54AA066D-271F-4C1A-B89A-0705A7689EE9}" type="datetimeFigureOut">
               <a:rPr lang="en-US" smtClean="0"/>
-              <a:t>10/9/2019</a:t>
+              <a:t>10/23/2019</a:t>
             </a:fld>
             <a:endParaRPr lang="en-US"/>
           </a:p>
@@ -3224,7 +3226,7 @@
           <a:p>
             <a:fld id="{54AA066D-271F-4C1A-B89A-0705A7689EE9}" type="datetimeFigureOut">
               <a:rPr lang="en-US" smtClean="0"/>
-              <a:t>10/9/2019</a:t>
+              <a:t>10/23/2019</a:t>
             </a:fld>
             <a:endParaRPr lang="en-US"/>
           </a:p>
@@ -3772,6 +3774,800 @@
   <p:clrMapOvr>
     <a:masterClrMapping/>
   </p:clrMapOvr>
+</p:sld>
+</file>
+
+<file path=ppt/slides/slide10.xml><?xml version="1.0" encoding="utf-8"?>
+<p:sld xmlns:a="http://schemas.openxmlformats.org/drawingml/2006/main" xmlns:r="http://schemas.openxmlformats.org/officeDocument/2006/relationships" xmlns:p="http://schemas.openxmlformats.org/presentationml/2006/main">
+  <p:cSld>
+    <p:spTree>
+      <p:nvGrpSpPr>
+        <p:cNvPr id="1" name=""/>
+        <p:cNvGrpSpPr/>
+        <p:nvPr/>
+      </p:nvGrpSpPr>
+      <p:grpSpPr>
+        <a:xfrm>
+          <a:off x="0" y="0"/>
+          <a:ext cx="0" cy="0"/>
+          <a:chOff x="0" y="0"/>
+          <a:chExt cx="0" cy="0"/>
+        </a:xfrm>
+      </p:grpSpPr>
+      <p:sp>
+        <p:nvSpPr>
+          <p:cNvPr id="16" name="Unvan 1"/>
+          <p:cNvSpPr>
+            <a:spLocks noGrp="1"/>
+          </p:cNvSpPr>
+          <p:nvPr>
+            <p:ph type="ctrTitle"/>
+          </p:nvPr>
+        </p:nvSpPr>
+        <p:spPr>
+          <a:xfrm>
+            <a:off x="3188043" y="325820"/>
+            <a:ext cx="5708821" cy="533101"/>
+          </a:xfrm>
+        </p:spPr>
+        <p:txBody>
+          <a:bodyPr>
+            <a:noAutofit/>
+          </a:bodyPr>
+          <a:lstStyle/>
+          <a:p>
+            <a:r>
+              <a:rPr lang="tr-TR" sz="3600" b="1" dirty="0" err="1">
+                <a:solidFill>
+                  <a:srgbClr val="CD1F26"/>
+                </a:solidFill>
+                <a:latin typeface="Arial" panose="020B0604020202020204" pitchFamily="34" charset="0"/>
+                <a:ea typeface="Verdana" panose="020B0604030504040204" pitchFamily="34" charset="0"/>
+                <a:cs typeface="Arial" panose="020B0604020202020204" pitchFamily="34" charset="0"/>
+              </a:rPr>
+              <a:t>Partitions</a:t>
+            </a:r>
+            <a:r>
+              <a:rPr lang="tr-TR" sz="3600" b="1" dirty="0">
+                <a:solidFill>
+                  <a:srgbClr val="CD1F26"/>
+                </a:solidFill>
+                <a:latin typeface="Arial" panose="020B0604020202020204" pitchFamily="34" charset="0"/>
+                <a:ea typeface="Verdana" panose="020B0604030504040204" pitchFamily="34" charset="0"/>
+                <a:cs typeface="Arial" panose="020B0604020202020204" pitchFamily="34" charset="0"/>
+              </a:rPr>
+              <a:t> ve </a:t>
+            </a:r>
+            <a:r>
+              <a:rPr lang="tr-TR" sz="3600" b="1" dirty="0" err="1">
+                <a:solidFill>
+                  <a:srgbClr val="CD1F26"/>
+                </a:solidFill>
+                <a:latin typeface="Arial" panose="020B0604020202020204" pitchFamily="34" charset="0"/>
+                <a:ea typeface="Verdana" panose="020B0604030504040204" pitchFamily="34" charset="0"/>
+                <a:cs typeface="Arial" panose="020B0604020202020204" pitchFamily="34" charset="0"/>
+              </a:rPr>
+              <a:t>Buckets</a:t>
+            </a:r>
+            <a:endParaRPr lang="en-US" sz="3600" b="1" dirty="0">
+              <a:solidFill>
+                <a:srgbClr val="CD1F26"/>
+              </a:solidFill>
+              <a:latin typeface="Arial" panose="020B0604020202020204" pitchFamily="34" charset="0"/>
+              <a:ea typeface="Verdana" panose="020B0604030504040204" pitchFamily="34" charset="0"/>
+              <a:cs typeface="Arial" panose="020B0604020202020204" pitchFamily="34" charset="0"/>
+            </a:endParaRPr>
+          </a:p>
+        </p:txBody>
+      </p:sp>
+      <p:sp>
+        <p:nvSpPr>
+          <p:cNvPr id="9" name="Metin kutusu 8"/>
+          <p:cNvSpPr txBox="1"/>
+          <p:nvPr/>
+        </p:nvSpPr>
+        <p:spPr>
+          <a:xfrm>
+            <a:off x="1570425" y="858921"/>
+            <a:ext cx="9397296" cy="5118196"/>
+          </a:xfrm>
+          <a:prstGeom prst="rect">
+            <a:avLst/>
+          </a:prstGeom>
+          <a:noFill/>
+        </p:spPr>
+        <p:txBody>
+          <a:bodyPr wrap="square" rtlCol="0">
+            <a:spAutoFit/>
+          </a:bodyPr>
+          <a:lstStyle/>
+          <a:p>
+            <a:pPr marL="285750" indent="-285750">
+              <a:lnSpc>
+                <a:spcPct val="150000"/>
+              </a:lnSpc>
+              <a:buFont typeface="Wingdings" panose="05000000000000000000" pitchFamily="2" charset="2"/>
+              <a:buChar char="ü"/>
+            </a:pPr>
+            <a:r>
+              <a:rPr lang="tr-TR" sz="2200" dirty="0"/>
+              <a:t>Her ikisi de veri organizasyonu ile ilgilidir.</a:t>
+            </a:r>
+          </a:p>
+          <a:p>
+            <a:pPr marL="285750" indent="-285750">
+              <a:lnSpc>
+                <a:spcPct val="150000"/>
+              </a:lnSpc>
+              <a:buFont typeface="Wingdings" panose="05000000000000000000" pitchFamily="2" charset="2"/>
+              <a:buChar char="ü"/>
+            </a:pPr>
+            <a:r>
+              <a:rPr lang="tr-TR" sz="2200" b="1" dirty="0" err="1"/>
+              <a:t>Partitions</a:t>
+            </a:r>
+            <a:r>
+              <a:rPr lang="tr-TR" sz="2200" dirty="0"/>
+              <a:t>, verinin kategorik bir sütun bazında farklı klasörlerde depolanmasıdır.</a:t>
+            </a:r>
+          </a:p>
+          <a:p>
+            <a:pPr marL="800100" lvl="1" indent="-342900">
+              <a:lnSpc>
+                <a:spcPct val="150000"/>
+              </a:lnSpc>
+              <a:buFont typeface="Calibri" panose="020F0502020204030204" pitchFamily="34" charset="0"/>
+              <a:buChar char="×"/>
+            </a:pPr>
+            <a:r>
+              <a:rPr lang="tr-TR" sz="2200" dirty="0"/>
+              <a:t>Aynı kategoriler bir arada olur sorgu performansı artar.</a:t>
+            </a:r>
+          </a:p>
+          <a:p>
+            <a:pPr marL="285750" indent="-285750">
+              <a:lnSpc>
+                <a:spcPct val="150000"/>
+              </a:lnSpc>
+              <a:buFont typeface="Wingdings" panose="05000000000000000000" pitchFamily="2" charset="2"/>
+              <a:buChar char="ü"/>
+            </a:pPr>
+            <a:r>
+              <a:rPr lang="tr-TR" sz="2200" b="1" dirty="0" err="1"/>
+              <a:t>Bucket</a:t>
+            </a:r>
+            <a:r>
+              <a:rPr lang="tr-TR" sz="2200" dirty="0"/>
+              <a:t>, klasör değil dosyadır. Aynı </a:t>
+            </a:r>
+            <a:r>
+              <a:rPr lang="tr-TR" sz="2200" dirty="0" err="1"/>
+              <a:t>partitions</a:t>
+            </a:r>
+            <a:r>
+              <a:rPr lang="tr-TR" sz="2200" dirty="0"/>
+              <a:t> altında birden fazla klasör olabilir.</a:t>
+            </a:r>
+          </a:p>
+          <a:p>
+            <a:pPr marL="800100" lvl="1" indent="-342900">
+              <a:lnSpc>
+                <a:spcPct val="150000"/>
+              </a:lnSpc>
+              <a:buFont typeface="Calibri" panose="020F0502020204030204" pitchFamily="34" charset="0"/>
+              <a:buChar char="×"/>
+            </a:pPr>
+            <a:r>
+              <a:rPr lang="tr-TR" sz="2200" dirty="0"/>
+              <a:t>Kendi başına veya </a:t>
+            </a:r>
+            <a:r>
+              <a:rPr lang="tr-TR" sz="2200" dirty="0" err="1"/>
+              <a:t>partitioning</a:t>
+            </a:r>
+            <a:r>
+              <a:rPr lang="tr-TR" sz="2200" dirty="0"/>
+              <a:t> ile birlikte kullanılabilir.</a:t>
+            </a:r>
+          </a:p>
+          <a:p>
+            <a:pPr marL="800100" lvl="1" indent="-342900">
+              <a:lnSpc>
+                <a:spcPct val="150000"/>
+              </a:lnSpc>
+              <a:buFont typeface="Calibri" panose="020F0502020204030204" pitchFamily="34" charset="0"/>
+              <a:buChar char="×"/>
+            </a:pPr>
+            <a:r>
+              <a:rPr lang="tr-TR" sz="2200" dirty="0"/>
+              <a:t>Hangi kayıt hangi </a:t>
+            </a:r>
+            <a:r>
+              <a:rPr lang="tr-TR" sz="2200" dirty="0" err="1"/>
+              <a:t>bucket</a:t>
+            </a:r>
+            <a:r>
+              <a:rPr lang="tr-TR" sz="2200" dirty="0"/>
+              <a:t> içinde depolanacağı </a:t>
+            </a:r>
+            <a:r>
+              <a:rPr lang="tr-TR" sz="2200" dirty="0" err="1"/>
+              <a:t>hashing</a:t>
+            </a:r>
+            <a:r>
+              <a:rPr lang="tr-TR" sz="2200" dirty="0"/>
+              <a:t> algoritması tarafından belirlenir.</a:t>
+            </a:r>
+          </a:p>
+          <a:p>
+            <a:pPr marL="800100" lvl="1" indent="-342900">
+              <a:lnSpc>
+                <a:spcPct val="150000"/>
+              </a:lnSpc>
+              <a:buFont typeface="Calibri" panose="020F0502020204030204" pitchFamily="34" charset="0"/>
+              <a:buChar char="×"/>
+            </a:pPr>
+            <a:r>
+              <a:rPr lang="tr-TR" sz="2200" dirty="0" err="1"/>
+              <a:t>Bucket</a:t>
+            </a:r>
+            <a:r>
+              <a:rPr lang="tr-TR" sz="2200" dirty="0"/>
+              <a:t> sayısını tablo oluştururken belirleyebiliriz.</a:t>
+            </a:r>
+          </a:p>
+          <a:p>
+            <a:pPr marL="800100" lvl="1" indent="-342900">
+              <a:lnSpc>
+                <a:spcPct val="150000"/>
+              </a:lnSpc>
+              <a:buFont typeface="Calibri" panose="020F0502020204030204" pitchFamily="34" charset="0"/>
+              <a:buChar char="×"/>
+            </a:pPr>
+            <a:r>
+              <a:rPr lang="tr-TR" sz="2200" dirty="0" err="1"/>
+              <a:t>Bucketed</a:t>
+            </a:r>
+            <a:r>
+              <a:rPr lang="tr-TR" sz="2200" dirty="0"/>
+              <a:t> Map </a:t>
+            </a:r>
+            <a:r>
+              <a:rPr lang="tr-TR" sz="2200" dirty="0" err="1"/>
+              <a:t>Joins</a:t>
+            </a:r>
+            <a:r>
+              <a:rPr lang="tr-TR" sz="2200" dirty="0"/>
+              <a:t> hızlıdır. (İki </a:t>
+            </a:r>
+            <a:r>
+              <a:rPr lang="tr-TR" sz="2200" dirty="0" err="1"/>
+              <a:t>bucketed</a:t>
+            </a:r>
+            <a:r>
+              <a:rPr lang="tr-TR" sz="2200" dirty="0"/>
+              <a:t> tablo çok hızlı birleşir)</a:t>
+            </a:r>
+          </a:p>
+        </p:txBody>
+      </p:sp>
+    </p:spTree>
+    <p:extLst>
+      <p:ext uri="{BB962C8B-B14F-4D97-AF65-F5344CB8AC3E}">
+        <p14:creationId xmlns:p14="http://schemas.microsoft.com/office/powerpoint/2010/main" val="2233610317"/>
+      </p:ext>
+    </p:extLst>
+  </p:cSld>
+  <p:clrMapOvr>
+    <a:masterClrMapping/>
+  </p:clrMapOvr>
+</p:sld>
+</file>
+
+<file path=ppt/slides/slide11.xml><?xml version="1.0" encoding="utf-8"?>
+<p:sld xmlns:a="http://schemas.openxmlformats.org/drawingml/2006/main" xmlns:r="http://schemas.openxmlformats.org/officeDocument/2006/relationships" xmlns:p="http://schemas.openxmlformats.org/presentationml/2006/main">
+  <p:cSld>
+    <p:spTree>
+      <p:nvGrpSpPr>
+        <p:cNvPr id="1" name=""/>
+        <p:cNvGrpSpPr/>
+        <p:nvPr/>
+      </p:nvGrpSpPr>
+      <p:grpSpPr>
+        <a:xfrm>
+          <a:off x="0" y="0"/>
+          <a:ext cx="0" cy="0"/>
+          <a:chOff x="0" y="0"/>
+          <a:chExt cx="0" cy="0"/>
+        </a:xfrm>
+      </p:grpSpPr>
+      <p:sp>
+        <p:nvSpPr>
+          <p:cNvPr id="16" name="Unvan 1"/>
+          <p:cNvSpPr>
+            <a:spLocks noGrp="1"/>
+          </p:cNvSpPr>
+          <p:nvPr>
+            <p:ph type="ctrTitle"/>
+          </p:nvPr>
+        </p:nvSpPr>
+        <p:spPr>
+          <a:xfrm>
+            <a:off x="3241589" y="189895"/>
+            <a:ext cx="5708821" cy="533101"/>
+          </a:xfrm>
+        </p:spPr>
+        <p:txBody>
+          <a:bodyPr>
+            <a:noAutofit/>
+          </a:bodyPr>
+          <a:lstStyle/>
+          <a:p>
+            <a:r>
+              <a:rPr lang="tr-TR" sz="3600" b="1" dirty="0" err="1">
+                <a:solidFill>
+                  <a:srgbClr val="CD1F26"/>
+                </a:solidFill>
+                <a:latin typeface="Arial" panose="020B0604020202020204" pitchFamily="34" charset="0"/>
+                <a:ea typeface="Verdana" panose="020B0604030504040204" pitchFamily="34" charset="0"/>
+                <a:cs typeface="Arial" panose="020B0604020202020204" pitchFamily="34" charset="0"/>
+              </a:rPr>
+              <a:t>Partitions</a:t>
+            </a:r>
+            <a:r>
+              <a:rPr lang="tr-TR" sz="3600" b="1" dirty="0">
+                <a:solidFill>
+                  <a:srgbClr val="CD1F26"/>
+                </a:solidFill>
+                <a:latin typeface="Arial" panose="020B0604020202020204" pitchFamily="34" charset="0"/>
+                <a:ea typeface="Verdana" panose="020B0604030504040204" pitchFamily="34" charset="0"/>
+                <a:cs typeface="Arial" panose="020B0604020202020204" pitchFamily="34" charset="0"/>
+              </a:rPr>
+              <a:t> ve </a:t>
+            </a:r>
+            <a:r>
+              <a:rPr lang="tr-TR" sz="3600" b="1" dirty="0" err="1">
+                <a:solidFill>
+                  <a:srgbClr val="CD1F26"/>
+                </a:solidFill>
+                <a:latin typeface="Arial" panose="020B0604020202020204" pitchFamily="34" charset="0"/>
+                <a:ea typeface="Verdana" panose="020B0604030504040204" pitchFamily="34" charset="0"/>
+                <a:cs typeface="Arial" panose="020B0604020202020204" pitchFamily="34" charset="0"/>
+              </a:rPr>
+              <a:t>Buckets</a:t>
+            </a:r>
+            <a:endParaRPr lang="en-US" sz="3600" b="1" dirty="0">
+              <a:solidFill>
+                <a:srgbClr val="CD1F26"/>
+              </a:solidFill>
+              <a:latin typeface="Arial" panose="020B0604020202020204" pitchFamily="34" charset="0"/>
+              <a:ea typeface="Verdana" panose="020B0604030504040204" pitchFamily="34" charset="0"/>
+              <a:cs typeface="Arial" panose="020B0604020202020204" pitchFamily="34" charset="0"/>
+            </a:endParaRPr>
+          </a:p>
+        </p:txBody>
+      </p:sp>
+      <p:pic>
+        <p:nvPicPr>
+          <p:cNvPr id="2" name="Resim 1">
+            <a:extLst>
+              <a:ext uri="{FF2B5EF4-FFF2-40B4-BE49-F238E27FC236}">
+                <a16:creationId xmlns:a16="http://schemas.microsoft.com/office/drawing/2014/main" id="{4C83F8A1-9FA2-410A-9475-BD3E69FA5648}"/>
+              </a:ext>
+            </a:extLst>
+          </p:cNvPr>
+          <p:cNvPicPr>
+            <a:picLocks noChangeAspect="1"/>
+          </p:cNvPicPr>
+          <p:nvPr/>
+        </p:nvPicPr>
+        <p:blipFill>
+          <a:blip r:embed="rId2"/>
+          <a:stretch>
+            <a:fillRect/>
+          </a:stretch>
+        </p:blipFill>
+        <p:spPr>
+          <a:xfrm>
+            <a:off x="142044" y="722996"/>
+            <a:ext cx="11907912" cy="6039693"/>
+          </a:xfrm>
+          <a:prstGeom prst="rect">
+            <a:avLst/>
+          </a:prstGeom>
+        </p:spPr>
+      </p:pic>
+      <p:sp>
+        <p:nvSpPr>
+          <p:cNvPr id="3" name="Dikdörtgen 2">
+            <a:extLst>
+              <a:ext uri="{FF2B5EF4-FFF2-40B4-BE49-F238E27FC236}">
+                <a16:creationId xmlns:a16="http://schemas.microsoft.com/office/drawing/2014/main" id="{D0164591-A18E-4C67-A423-7C08C7F56F02}"/>
+              </a:ext>
+            </a:extLst>
+          </p:cNvPr>
+          <p:cNvSpPr/>
+          <p:nvPr/>
+        </p:nvSpPr>
+        <p:spPr>
+          <a:xfrm>
+            <a:off x="5189838" y="6529605"/>
+            <a:ext cx="6549082" cy="276999"/>
+          </a:xfrm>
+          <a:prstGeom prst="rect">
+            <a:avLst/>
+          </a:prstGeom>
+        </p:spPr>
+        <p:txBody>
+          <a:bodyPr wrap="square">
+            <a:spAutoFit/>
+          </a:bodyPr>
+          <a:lstStyle/>
+          <a:p>
+            <a:r>
+              <a:rPr lang="tr-TR" sz="1200" dirty="0">
+                <a:hlinkClick r:id="rId3"/>
+              </a:rPr>
+              <a:t>Kaynak: https://www.udemy.com/course/hadoop-querying-tool-hive-to-advance-hivereal-time-usage</a:t>
+            </a:r>
+            <a:endParaRPr lang="tr-TR" sz="1200" dirty="0"/>
+          </a:p>
+        </p:txBody>
+      </p:sp>
+      <p:sp>
+        <p:nvSpPr>
+          <p:cNvPr id="4" name="Dikdörtgen 3">
+            <a:extLst>
+              <a:ext uri="{FF2B5EF4-FFF2-40B4-BE49-F238E27FC236}">
+                <a16:creationId xmlns:a16="http://schemas.microsoft.com/office/drawing/2014/main" id="{BDC3434C-4F34-4259-9FBC-2FD06CFE7130}"/>
+              </a:ext>
+            </a:extLst>
+          </p:cNvPr>
+          <p:cNvSpPr/>
+          <p:nvPr/>
+        </p:nvSpPr>
+        <p:spPr>
+          <a:xfrm>
+            <a:off x="1437502" y="3949892"/>
+            <a:ext cx="1083276" cy="2812797"/>
+          </a:xfrm>
+          <a:prstGeom prst="rect">
+            <a:avLst/>
+          </a:prstGeom>
+          <a:noFill/>
+          <a:ln w="28575"/>
+        </p:spPr>
+        <p:style>
+          <a:lnRef idx="2">
+            <a:schemeClr val="accent1">
+              <a:shade val="50000"/>
+            </a:schemeClr>
+          </a:lnRef>
+          <a:fillRef idx="1">
+            <a:schemeClr val="accent1"/>
+          </a:fillRef>
+          <a:effectRef idx="0">
+            <a:schemeClr val="accent1"/>
+          </a:effectRef>
+          <a:fontRef idx="minor">
+            <a:schemeClr val="lt1"/>
+          </a:fontRef>
+        </p:style>
+        <p:txBody>
+          <a:bodyPr rtlCol="0" anchor="ctr"/>
+          <a:lstStyle/>
+          <a:p>
+            <a:pPr algn="ctr"/>
+            <a:endParaRPr lang="tr-TR"/>
+          </a:p>
+        </p:txBody>
+      </p:sp>
+      <p:sp>
+        <p:nvSpPr>
+          <p:cNvPr id="8" name="Dikdörtgen 7">
+            <a:extLst>
+              <a:ext uri="{FF2B5EF4-FFF2-40B4-BE49-F238E27FC236}">
+                <a16:creationId xmlns:a16="http://schemas.microsoft.com/office/drawing/2014/main" id="{15649B5E-1E6E-407B-AF91-04711CFFF995}"/>
+              </a:ext>
+            </a:extLst>
+          </p:cNvPr>
+          <p:cNvSpPr/>
+          <p:nvPr/>
+        </p:nvSpPr>
+        <p:spPr>
+          <a:xfrm>
+            <a:off x="275847" y="3958280"/>
+            <a:ext cx="959826" cy="2812797"/>
+          </a:xfrm>
+          <a:prstGeom prst="rect">
+            <a:avLst/>
+          </a:prstGeom>
+          <a:noFill/>
+          <a:ln w="28575"/>
+        </p:spPr>
+        <p:style>
+          <a:lnRef idx="2">
+            <a:schemeClr val="accent1">
+              <a:shade val="50000"/>
+            </a:schemeClr>
+          </a:lnRef>
+          <a:fillRef idx="1">
+            <a:schemeClr val="accent1"/>
+          </a:fillRef>
+          <a:effectRef idx="0">
+            <a:schemeClr val="accent1"/>
+          </a:effectRef>
+          <a:fontRef idx="minor">
+            <a:schemeClr val="lt1"/>
+          </a:fontRef>
+        </p:style>
+        <p:txBody>
+          <a:bodyPr rtlCol="0" anchor="ctr"/>
+          <a:lstStyle/>
+          <a:p>
+            <a:pPr algn="ctr"/>
+            <a:endParaRPr lang="tr-TR"/>
+          </a:p>
+        </p:txBody>
+      </p:sp>
+    </p:spTree>
+    <p:extLst>
+      <p:ext uri="{BB962C8B-B14F-4D97-AF65-F5344CB8AC3E}">
+        <p14:creationId xmlns:p14="http://schemas.microsoft.com/office/powerpoint/2010/main" val="3699714268"/>
+      </p:ext>
+    </p:extLst>
+  </p:cSld>
+  <p:clrMapOvr>
+    <a:masterClrMapping/>
+  </p:clrMapOvr>
+  <p:timing>
+    <p:tnLst>
+      <p:par>
+        <p:cTn id="1" dur="indefinite" restart="never" nodeType="tmRoot">
+          <p:childTnLst>
+            <p:seq concurrent="1" nextAc="seek">
+              <p:cTn id="2" dur="indefinite" nodeType="mainSeq">
+                <p:childTnLst>
+                  <p:par>
+                    <p:cTn id="3" fill="hold">
+                      <p:stCondLst>
+                        <p:cond delay="indefinite"/>
+                      </p:stCondLst>
+                      <p:childTnLst>
+                        <p:par>
+                          <p:cTn id="4" fill="hold">
+                            <p:stCondLst>
+                              <p:cond delay="0"/>
+                            </p:stCondLst>
+                            <p:childTnLst>
+                              <p:par>
+                                <p:cTn id="5" presetID="10" presetClass="entr" presetSubtype="0" fill="hold" grpId="0" nodeType="clickEffect">
+                                  <p:stCondLst>
+                                    <p:cond delay="0"/>
+                                  </p:stCondLst>
+                                  <p:childTnLst>
+                                    <p:set>
+                                      <p:cBhvr>
+                                        <p:cTn id="6" dur="1" fill="hold">
+                                          <p:stCondLst>
+                                            <p:cond delay="0"/>
+                                          </p:stCondLst>
+                                        </p:cTn>
+                                        <p:tgtEl>
+                                          <p:spTgt spid="8"/>
+                                        </p:tgtEl>
+                                        <p:attrNameLst>
+                                          <p:attrName>style.visibility</p:attrName>
+                                        </p:attrNameLst>
+                                      </p:cBhvr>
+                                      <p:to>
+                                        <p:strVal val="visible"/>
+                                      </p:to>
+                                    </p:set>
+                                    <p:animEffect transition="in" filter="fade">
+                                      <p:cBhvr>
+                                        <p:cTn id="7" dur="500"/>
+                                        <p:tgtEl>
+                                          <p:spTgt spid="8"/>
+                                        </p:tgtEl>
+                                      </p:cBhvr>
+                                    </p:animEffect>
+                                  </p:childTnLst>
+                                </p:cTn>
+                              </p:par>
+                            </p:childTnLst>
+                          </p:cTn>
+                        </p:par>
+                      </p:childTnLst>
+                    </p:cTn>
+                  </p:par>
+                  <p:par>
+                    <p:cTn id="8" fill="hold">
+                      <p:stCondLst>
+                        <p:cond delay="indefinite"/>
+                      </p:stCondLst>
+                      <p:childTnLst>
+                        <p:par>
+                          <p:cTn id="9" fill="hold">
+                            <p:stCondLst>
+                              <p:cond delay="0"/>
+                            </p:stCondLst>
+                            <p:childTnLst>
+                              <p:par>
+                                <p:cTn id="10" presetID="10" presetClass="exit" presetSubtype="0" fill="hold" grpId="1" nodeType="clickEffect">
+                                  <p:stCondLst>
+                                    <p:cond delay="0"/>
+                                  </p:stCondLst>
+                                  <p:childTnLst>
+                                    <p:animEffect transition="out" filter="fade">
+                                      <p:cBhvr>
+                                        <p:cTn id="11" dur="500"/>
+                                        <p:tgtEl>
+                                          <p:spTgt spid="8"/>
+                                        </p:tgtEl>
+                                      </p:cBhvr>
+                                    </p:animEffect>
+                                    <p:set>
+                                      <p:cBhvr>
+                                        <p:cTn id="12" dur="1" fill="hold">
+                                          <p:stCondLst>
+                                            <p:cond delay="499"/>
+                                          </p:stCondLst>
+                                        </p:cTn>
+                                        <p:tgtEl>
+                                          <p:spTgt spid="8"/>
+                                        </p:tgtEl>
+                                        <p:attrNameLst>
+                                          <p:attrName>style.visibility</p:attrName>
+                                        </p:attrNameLst>
+                                      </p:cBhvr>
+                                      <p:to>
+                                        <p:strVal val="hidden"/>
+                                      </p:to>
+                                    </p:set>
+                                  </p:childTnLst>
+                                </p:cTn>
+                              </p:par>
+                            </p:childTnLst>
+                          </p:cTn>
+                        </p:par>
+                      </p:childTnLst>
+                    </p:cTn>
+                  </p:par>
+                  <p:par>
+                    <p:cTn id="13" fill="hold">
+                      <p:stCondLst>
+                        <p:cond delay="indefinite"/>
+                      </p:stCondLst>
+                      <p:childTnLst>
+                        <p:par>
+                          <p:cTn id="14" fill="hold">
+                            <p:stCondLst>
+                              <p:cond delay="0"/>
+                            </p:stCondLst>
+                            <p:childTnLst>
+                              <p:par>
+                                <p:cTn id="15" presetID="10" presetClass="entr" presetSubtype="0" fill="hold" grpId="0" nodeType="clickEffect">
+                                  <p:stCondLst>
+                                    <p:cond delay="0"/>
+                                  </p:stCondLst>
+                                  <p:childTnLst>
+                                    <p:set>
+                                      <p:cBhvr>
+                                        <p:cTn id="16" dur="1" fill="hold">
+                                          <p:stCondLst>
+                                            <p:cond delay="0"/>
+                                          </p:stCondLst>
+                                        </p:cTn>
+                                        <p:tgtEl>
+                                          <p:spTgt spid="4"/>
+                                        </p:tgtEl>
+                                        <p:attrNameLst>
+                                          <p:attrName>style.visibility</p:attrName>
+                                        </p:attrNameLst>
+                                      </p:cBhvr>
+                                      <p:to>
+                                        <p:strVal val="visible"/>
+                                      </p:to>
+                                    </p:set>
+                                    <p:animEffect transition="in" filter="fade">
+                                      <p:cBhvr>
+                                        <p:cTn id="17" dur="500"/>
+                                        <p:tgtEl>
+                                          <p:spTgt spid="4"/>
+                                        </p:tgtEl>
+                                      </p:cBhvr>
+                                    </p:animEffect>
+                                  </p:childTnLst>
+                                </p:cTn>
+                              </p:par>
+                            </p:childTnLst>
+                          </p:cTn>
+                        </p:par>
+                      </p:childTnLst>
+                    </p:cTn>
+                  </p:par>
+                  <p:par>
+                    <p:cTn id="18" fill="hold">
+                      <p:stCondLst>
+                        <p:cond delay="indefinite"/>
+                      </p:stCondLst>
+                      <p:childTnLst>
+                        <p:par>
+                          <p:cTn id="19" fill="hold">
+                            <p:stCondLst>
+                              <p:cond delay="0"/>
+                            </p:stCondLst>
+                            <p:childTnLst>
+                              <p:par>
+                                <p:cTn id="20" presetID="10" presetClass="exit" presetSubtype="0" fill="hold" grpId="1" nodeType="clickEffect">
+                                  <p:stCondLst>
+                                    <p:cond delay="0"/>
+                                  </p:stCondLst>
+                                  <p:childTnLst>
+                                    <p:animEffect transition="out" filter="fade">
+                                      <p:cBhvr>
+                                        <p:cTn id="21" dur="500"/>
+                                        <p:tgtEl>
+                                          <p:spTgt spid="4"/>
+                                        </p:tgtEl>
+                                      </p:cBhvr>
+                                    </p:animEffect>
+                                    <p:set>
+                                      <p:cBhvr>
+                                        <p:cTn id="22" dur="1" fill="hold">
+                                          <p:stCondLst>
+                                            <p:cond delay="499"/>
+                                          </p:stCondLst>
+                                        </p:cTn>
+                                        <p:tgtEl>
+                                          <p:spTgt spid="4"/>
+                                        </p:tgtEl>
+                                        <p:attrNameLst>
+                                          <p:attrName>style.visibility</p:attrName>
+                                        </p:attrNameLst>
+                                      </p:cBhvr>
+                                      <p:to>
+                                        <p:strVal val="hidden"/>
+                                      </p:to>
+                                    </p:set>
+                                  </p:childTnLst>
+                                </p:cTn>
+                              </p:par>
+                            </p:childTnLst>
+                          </p:cTn>
+                        </p:par>
+                      </p:childTnLst>
+                    </p:cTn>
+                  </p:par>
+                </p:childTnLst>
+              </p:cTn>
+              <p:prevCondLst>
+                <p:cond evt="onPrev" delay="0">
+                  <p:tgtEl>
+                    <p:sldTgt/>
+                  </p:tgtEl>
+                </p:cond>
+              </p:prevCondLst>
+              <p:nextCondLst>
+                <p:cond evt="onNext" delay="0">
+                  <p:tgtEl>
+                    <p:sldTgt/>
+                  </p:tgtEl>
+                </p:cond>
+              </p:nextCondLst>
+            </p:seq>
+          </p:childTnLst>
+        </p:cTn>
+      </p:par>
+    </p:tnLst>
+    <p:bldLst>
+      <p:bldP spid="4" grpId="0" animBg="1"/>
+      <p:bldP spid="4" grpId="1" animBg="1"/>
+      <p:bldP spid="8" grpId="0" animBg="1"/>
+      <p:bldP spid="8" grpId="1" animBg="1"/>
+    </p:bldLst>
+  </p:timing>
 </p:sld>
 </file>
 

</xml_diff>